<commit_message>
reproduc pipeline image added
</commit_message>
<xml_diff>
--- a/images/reproducible_pipeline.pptx
+++ b/images/reproducible_pipeline.pptx
@@ -3902,8 +3902,8 @@
         </p:nvSpPr>
         <p:spPr>
           <a:xfrm>
-            <a:off x="9827203" y="488201"/>
-            <a:ext cx="2364797" cy="923330"/>
+            <a:off x="9756158" y="459025"/>
+            <a:ext cx="2556905" cy="923330"/>
           </a:xfrm>
           <a:prstGeom prst="rect">
             <a:avLst/>
@@ -3918,7 +3918,7 @@
           <a:p>
             <a:r>
               <a:rPr lang="en-US" dirty="0"/>
-              <a:t>Query, Analyze, and Develop Manuscript with Quarto Document</a:t>
+              <a:t>Query, Analyze, and Develop Manuscript within Quarto Document</a:t>
             </a:r>
           </a:p>
         </p:txBody>
@@ -4007,7 +4007,7 @@
         </p:nvSpPr>
         <p:spPr>
           <a:xfrm>
-            <a:off x="7202078" y="3450236"/>
+            <a:off x="7205283" y="3521733"/>
             <a:ext cx="1547051" cy="646331"/>
           </a:xfrm>
           <a:prstGeom prst="rect">
@@ -4136,6 +4136,181 @@
           <a:p>
             <a:pPr algn="ctr"/>
             <a:endParaRPr lang="en-US"/>
+          </a:p>
+        </p:txBody>
+      </p:sp>
+      <p:sp>
+        <p:nvSpPr>
+          <p:cNvPr id="41" name="TextBox 40">
+            <a:extLst>
+              <a:ext uri="{FF2B5EF4-FFF2-40B4-BE49-F238E27FC236}">
+                <a16:creationId xmlns:a16="http://schemas.microsoft.com/office/drawing/2014/main" id="{D13CF9CC-D84D-06DC-C167-52AA5791E984}"/>
+              </a:ext>
+            </a:extLst>
+          </p:cNvPr>
+          <p:cNvSpPr txBox="1"/>
+          <p:nvPr/>
+        </p:nvSpPr>
+        <p:spPr>
+          <a:xfrm rot="20390826">
+            <a:off x="7487071" y="2409343"/>
+            <a:ext cx="678752" cy="369332"/>
+          </a:xfrm>
+          <a:prstGeom prst="rect">
+            <a:avLst/>
+          </a:prstGeom>
+          <a:noFill/>
+        </p:spPr>
+        <p:txBody>
+          <a:bodyPr wrap="square" rtlCol="0">
+            <a:spAutoFit/>
+          </a:bodyPr>
+          <a:lstStyle/>
+          <a:p>
+            <a:r>
+              <a:rPr lang="en-US" dirty="0"/>
+              <a:t>Push</a:t>
+            </a:r>
+          </a:p>
+        </p:txBody>
+      </p:sp>
+      <p:sp>
+        <p:nvSpPr>
+          <p:cNvPr id="42" name="TextBox 41">
+            <a:extLst>
+              <a:ext uri="{FF2B5EF4-FFF2-40B4-BE49-F238E27FC236}">
+                <a16:creationId xmlns:a16="http://schemas.microsoft.com/office/drawing/2014/main" id="{86CE53A3-E8D3-9D41-E03E-3D05669A092C}"/>
+              </a:ext>
+            </a:extLst>
+          </p:cNvPr>
+          <p:cNvSpPr txBox="1"/>
+          <p:nvPr/>
+        </p:nvSpPr>
+        <p:spPr>
+          <a:xfrm rot="20390826">
+            <a:off x="7638693" y="2746210"/>
+            <a:ext cx="680232" cy="369332"/>
+          </a:xfrm>
+          <a:prstGeom prst="rect">
+            <a:avLst/>
+          </a:prstGeom>
+          <a:noFill/>
+        </p:spPr>
+        <p:txBody>
+          <a:bodyPr wrap="square" rtlCol="0">
+            <a:spAutoFit/>
+          </a:bodyPr>
+          <a:lstStyle/>
+          <a:p>
+            <a:r>
+              <a:rPr lang="en-US" dirty="0"/>
+              <a:t>Pull</a:t>
+            </a:r>
+          </a:p>
+        </p:txBody>
+      </p:sp>
+      <p:sp>
+        <p:nvSpPr>
+          <p:cNvPr id="43" name="TextBox 42">
+            <a:extLst>
+              <a:ext uri="{FF2B5EF4-FFF2-40B4-BE49-F238E27FC236}">
+                <a16:creationId xmlns:a16="http://schemas.microsoft.com/office/drawing/2014/main" id="{A39EBD6F-E078-A1C5-7657-30D2112031FC}"/>
+              </a:ext>
+            </a:extLst>
+          </p:cNvPr>
+          <p:cNvSpPr txBox="1"/>
+          <p:nvPr/>
+        </p:nvSpPr>
+        <p:spPr>
+          <a:xfrm rot="761695">
+            <a:off x="7629653" y="4180220"/>
+            <a:ext cx="740238" cy="369332"/>
+          </a:xfrm>
+          <a:prstGeom prst="rect">
+            <a:avLst/>
+          </a:prstGeom>
+          <a:noFill/>
+        </p:spPr>
+        <p:txBody>
+          <a:bodyPr wrap="square" rtlCol="0">
+            <a:spAutoFit/>
+          </a:bodyPr>
+          <a:lstStyle/>
+          <a:p>
+            <a:r>
+              <a:rPr lang="en-US" dirty="0"/>
+              <a:t>Push</a:t>
+            </a:r>
+          </a:p>
+        </p:txBody>
+      </p:sp>
+      <p:sp>
+        <p:nvSpPr>
+          <p:cNvPr id="44" name="TextBox 43">
+            <a:extLst>
+              <a:ext uri="{FF2B5EF4-FFF2-40B4-BE49-F238E27FC236}">
+                <a16:creationId xmlns:a16="http://schemas.microsoft.com/office/drawing/2014/main" id="{1E2ED453-E97B-F770-B0FB-98647B7C7B1E}"/>
+              </a:ext>
+            </a:extLst>
+          </p:cNvPr>
+          <p:cNvSpPr txBox="1"/>
+          <p:nvPr/>
+        </p:nvSpPr>
+        <p:spPr>
+          <a:xfrm rot="860398">
+            <a:off x="7589046" y="4495981"/>
+            <a:ext cx="680232" cy="369332"/>
+          </a:xfrm>
+          <a:prstGeom prst="rect">
+            <a:avLst/>
+          </a:prstGeom>
+          <a:noFill/>
+        </p:spPr>
+        <p:txBody>
+          <a:bodyPr wrap="square" rtlCol="0">
+            <a:spAutoFit/>
+          </a:bodyPr>
+          <a:lstStyle/>
+          <a:p>
+            <a:r>
+              <a:rPr lang="en-US" dirty="0"/>
+              <a:t>Pull</a:t>
+            </a:r>
+          </a:p>
+        </p:txBody>
+      </p:sp>
+      <p:sp>
+        <p:nvSpPr>
+          <p:cNvPr id="45" name="TextBox 44">
+            <a:extLst>
+              <a:ext uri="{FF2B5EF4-FFF2-40B4-BE49-F238E27FC236}">
+                <a16:creationId xmlns:a16="http://schemas.microsoft.com/office/drawing/2014/main" id="{EF001E24-5A38-0678-5A39-4E9A52141E06}"/>
+              </a:ext>
+            </a:extLst>
+          </p:cNvPr>
+          <p:cNvSpPr txBox="1"/>
+          <p:nvPr/>
+        </p:nvSpPr>
+        <p:spPr>
+          <a:xfrm>
+            <a:off x="97616" y="2366172"/>
+            <a:ext cx="2520324" cy="646331"/>
+          </a:xfrm>
+          <a:prstGeom prst="rect">
+            <a:avLst/>
+          </a:prstGeom>
+          <a:noFill/>
+        </p:spPr>
+        <p:txBody>
+          <a:bodyPr wrap="square" rtlCol="0">
+            <a:spAutoFit/>
+          </a:bodyPr>
+          <a:lstStyle/>
+          <a:p>
+            <a:r>
+              <a:rPr lang="en-US" dirty="0"/>
+              <a:t>Reproducibility results in Happy Healthy Frogs</a:t>
+            </a:r>
           </a:p>
         </p:txBody>
       </p:sp>

</xml_diff>